<commit_message>
added intro, updated to do sections
</commit_message>
<xml_diff>
--- a/LaTeX/state_machines/Presentation1.pptx
+++ b/LaTeX/state_machines/Presentation1.pptx
@@ -3962,7 +3962,7 @@
         <p:spPr>
           <a:xfrm>
             <a:off x="2980927" y="3636502"/>
-            <a:ext cx="404278" cy="307777"/>
+            <a:ext cx="452368" cy="307777"/>
           </a:xfrm>
           <a:prstGeom prst="rect">
             <a:avLst/>
@@ -3982,10 +3982,10 @@
               <a:t>P</a:t>
             </a:r>
             <a:r>
-              <a:rPr lang="en-IE" sz="1400" baseline="-25000" dirty="0">
+              <a:rPr lang="en-IE" sz="1400" baseline="-25000" dirty="0" smtClean="0">
                 <a:latin typeface="Century Schoolbook" panose="02040604050505020304" pitchFamily="18" charset="0"/>
               </a:rPr>
-              <a:t>H</a:t>
+              <a:t>IH</a:t>
             </a:r>
             <a:endParaRPr lang="en-IE" sz="1400" dirty="0">
               <a:latin typeface="Century Schoolbook" panose="02040604050505020304" pitchFamily="18" charset="0"/>

</xml_diff>